<commit_message>
Improving Intro Slide & Instructions
</commit_message>
<xml_diff>
--- a/00-Background/MSRESOLVEIntroSlide.pptx
+++ b/00-Background/MSRESOLVEIntroSlide.pptx
@@ -197,7 +197,7 @@
           <a:p>
             <a:fld id="{D6E32FFE-E710-4ECC-B966-27292F902E9F}" type="datetimeFigureOut">
               <a:rPr lang="en-US" smtClean="0"/>
-              <a:t>8/12/2022</a:t>
+              <a:t>8/13/2022</a:t>
             </a:fld>
             <a:endParaRPr lang="en-US"/>
           </a:p>
@@ -560,7 +560,7 @@
             </a:pPr>
             <a:r>
               <a:rPr lang="en-US" sz="3600" dirty="0"/>
-              <a:t>MSRESOLVE has  capabilities to solve such cases, to consider uncertainties.</a:t>
+              <a:t>MSRESOLVE has  capabilities to solve such cases, in particular using Sequential Linear Subtraction (SLS) with implicit error correction, and MSRESOLVE can also consider input uncertainties to report the final concentrations with their uncertainties.</a:t>
             </a:r>
           </a:p>
           <a:p>
@@ -569,23 +569,17 @@
             </a:pPr>
             <a:r>
               <a:rPr lang="en-US" sz="3600" dirty="0"/>
-              <a:t>Pre-processing is also very important for accuracy (baseline corrections, smoothing, etc.) and MSRESOLVE has these features, also.</a:t>
+              <a:t>In practice, one also has to do pre-processing of the data, and as can be seen in the flow chart, and MSRESOLVE has these features, also: baseline correction, smoothing, etc.</a:t>
             </a:r>
           </a:p>
           <a:p>
             <a:pPr marL="742950" indent="-742950">
               <a:buAutoNum type="arabicParenBoth"/>
             </a:pPr>
-            <a:endParaRPr lang="en-US" sz="3600" dirty="0"/>
-          </a:p>
-          <a:p>
-            <a:pPr marL="742950" indent="-742950">
-              <a:buAutoNum type="arabicParenBoth"/>
-            </a:pPr>
-            <a:endParaRPr lang="en-US" sz="3600"/>
-          </a:p>
-          <a:p>
-            <a:endParaRPr lang="en-US" dirty="0"/>
+            <a:r>
+              <a:rPr lang="en-US" sz="3600" dirty="0"/>
+              <a:t>MSRESOLVE enables repeat analyses of time series with different choices. This is very useful since if one wants to change which mass is used or to add another molecule into the analysis etc., attempting to make such changes is quick with MSRESOLVE, and saves the use hours of work.</a:t>
+            </a:r>
           </a:p>
         </p:txBody>
       </p:sp>
@@ -756,7 +750,7 @@
           <a:p>
             <a:fld id="{E7A00B41-B7D3-457C-A540-CC12A459972A}" type="datetimeFigureOut">
               <a:rPr lang="en-US" smtClean="0"/>
-              <a:t>8/12/2022</a:t>
+              <a:t>8/13/2022</a:t>
             </a:fld>
             <a:endParaRPr lang="en-US"/>
           </a:p>
@@ -926,7 +920,7 @@
           <a:p>
             <a:fld id="{E7A00B41-B7D3-457C-A540-CC12A459972A}" type="datetimeFigureOut">
               <a:rPr lang="en-US" smtClean="0"/>
-              <a:t>8/12/2022</a:t>
+              <a:t>8/13/2022</a:t>
             </a:fld>
             <a:endParaRPr lang="en-US"/>
           </a:p>
@@ -1106,7 +1100,7 @@
           <a:p>
             <a:fld id="{E7A00B41-B7D3-457C-A540-CC12A459972A}" type="datetimeFigureOut">
               <a:rPr lang="en-US" smtClean="0"/>
-              <a:t>8/12/2022</a:t>
+              <a:t>8/13/2022</a:t>
             </a:fld>
             <a:endParaRPr lang="en-US"/>
           </a:p>
@@ -1276,7 +1270,7 @@
           <a:p>
             <a:fld id="{E7A00B41-B7D3-457C-A540-CC12A459972A}" type="datetimeFigureOut">
               <a:rPr lang="en-US" smtClean="0"/>
-              <a:t>8/12/2022</a:t>
+              <a:t>8/13/2022</a:t>
             </a:fld>
             <a:endParaRPr lang="en-US"/>
           </a:p>
@@ -1520,7 +1514,7 @@
           <a:p>
             <a:fld id="{E7A00B41-B7D3-457C-A540-CC12A459972A}" type="datetimeFigureOut">
               <a:rPr lang="en-US" smtClean="0"/>
-              <a:t>8/12/2022</a:t>
+              <a:t>8/13/2022</a:t>
             </a:fld>
             <a:endParaRPr lang="en-US"/>
           </a:p>
@@ -1752,7 +1746,7 @@
           <a:p>
             <a:fld id="{E7A00B41-B7D3-457C-A540-CC12A459972A}" type="datetimeFigureOut">
               <a:rPr lang="en-US" smtClean="0"/>
-              <a:t>8/12/2022</a:t>
+              <a:t>8/13/2022</a:t>
             </a:fld>
             <a:endParaRPr lang="en-US"/>
           </a:p>
@@ -2119,7 +2113,7 @@
           <a:p>
             <a:fld id="{E7A00B41-B7D3-457C-A540-CC12A459972A}" type="datetimeFigureOut">
               <a:rPr lang="en-US" smtClean="0"/>
-              <a:t>8/12/2022</a:t>
+              <a:t>8/13/2022</a:t>
             </a:fld>
             <a:endParaRPr lang="en-US"/>
           </a:p>
@@ -2237,7 +2231,7 @@
           <a:p>
             <a:fld id="{E7A00B41-B7D3-457C-A540-CC12A459972A}" type="datetimeFigureOut">
               <a:rPr lang="en-US" smtClean="0"/>
-              <a:t>8/12/2022</a:t>
+              <a:t>8/13/2022</a:t>
             </a:fld>
             <a:endParaRPr lang="en-US"/>
           </a:p>
@@ -2332,7 +2326,7 @@
           <a:p>
             <a:fld id="{E7A00B41-B7D3-457C-A540-CC12A459972A}" type="datetimeFigureOut">
               <a:rPr lang="en-US" smtClean="0"/>
-              <a:t>8/12/2022</a:t>
+              <a:t>8/13/2022</a:t>
             </a:fld>
             <a:endParaRPr lang="en-US"/>
           </a:p>
@@ -2609,7 +2603,7 @@
           <a:p>
             <a:fld id="{E7A00B41-B7D3-457C-A540-CC12A459972A}" type="datetimeFigureOut">
               <a:rPr lang="en-US" smtClean="0"/>
-              <a:t>8/12/2022</a:t>
+              <a:t>8/13/2022</a:t>
             </a:fld>
             <a:endParaRPr lang="en-US"/>
           </a:p>
@@ -2866,7 +2860,7 @@
           <a:p>
             <a:fld id="{E7A00B41-B7D3-457C-A540-CC12A459972A}" type="datetimeFigureOut">
               <a:rPr lang="en-US" smtClean="0"/>
-              <a:t>8/12/2022</a:t>
+              <a:t>8/13/2022</a:t>
             </a:fld>
             <a:endParaRPr lang="en-US"/>
           </a:p>
@@ -3079,7 +3073,7 @@
           <a:p>
             <a:fld id="{E7A00B41-B7D3-457C-A540-CC12A459972A}" type="datetimeFigureOut">
               <a:rPr lang="en-US" smtClean="0"/>
-              <a:t>8/12/2022</a:t>
+              <a:t>8/13/2022</a:t>
             </a:fld>
             <a:endParaRPr lang="en-US"/>
           </a:p>
@@ -4149,7 +4143,7 @@
                   <a:ea typeface="Times New Roman" panose="02020603050405020304" pitchFamily="18" charset="0"/>
                   <a:cs typeface="Times New Roman" panose="02020603050405020304" pitchFamily="18" charset="0"/>
                 </a:rPr>
-                <a:t>Signal Relative to CO</a:t>
+                <a:t>Concentration Relative to CO</a:t>
               </a:r>
             </a:p>
           </p:txBody>
@@ -9209,7 +9203,7 @@
         <p:spPr>
           <a:xfrm>
             <a:off x="7402490" y="19123567"/>
-            <a:ext cx="16561750" cy="10618291"/>
+            <a:ext cx="16561750" cy="13388280"/>
           </a:xfrm>
           <a:prstGeom prst="rect">
             <a:avLst/>
@@ -9228,9 +9222,6 @@
             </a:r>
           </a:p>
           <a:p>
-            <a:endParaRPr lang="en-US" sz="3600" dirty="0"/>
-          </a:p>
-          <a:p>
             <a:pPr marL="742950" indent="-742950">
               <a:buAutoNum type="arabicParenBoth"/>
             </a:pPr>
@@ -9283,7 +9274,7 @@
             </a:pPr>
             <a:r>
               <a:rPr lang="en-US" sz="3600" dirty="0"/>
-              <a:t>MSRESOLVE has  capabilities to solve such cases, to consider uncertainties.</a:t>
+              <a:t>MSRESOLVE has  capabilities to solve such cases, in particular using Sequential Linear Subtraction (SLS) with implicit error correction, and MSRESOLVE can also consider input uncertainties to report the final concentrations with their uncertainties.</a:t>
             </a:r>
           </a:p>
           <a:p>
@@ -9292,20 +9283,21 @@
             </a:pPr>
             <a:r>
               <a:rPr lang="en-US" sz="3600" dirty="0"/>
-              <a:t>Pre-processing is also very important for accuracy (baseline corrections, smoothing, etc.) and MSRESOLVE has these features, also.</a:t>
+              <a:t>In practice, one also has to do pre-processing of the data, and as can be seen in the flow chart, and MSRESOLVE has these features, also: baseline correction, smoothing, etc.</a:t>
             </a:r>
           </a:p>
           <a:p>
             <a:pPr marL="742950" indent="-742950">
               <a:buAutoNum type="arabicParenBoth"/>
             </a:pPr>
-            <a:endParaRPr lang="en-US" sz="3600" dirty="0"/>
-          </a:p>
-          <a:p>
-            <a:pPr marL="742950" indent="-742950">
-              <a:buAutoNum type="arabicParenBoth"/>
-            </a:pPr>
-            <a:endParaRPr lang="en-US" sz="3600" dirty="0"/>
+            <a:r>
+              <a:rPr lang="en-US" sz="3600" dirty="0"/>
+              <a:t>MSRESOLVE enables repeat analyses of time series with different choices. </a:t>
+            </a:r>
+            <a:r>
+              <a:rPr lang="en-US" sz="3600"/>
+              <a:t>This is very useful since if one wants to change which mass is used or to add another molecule into the analysis etc., attempting to make such changes is quick with MSRESOLVE, and saves the use hours of work.</a:t>
+            </a:r>
           </a:p>
         </p:txBody>
       </p:sp>

</xml_diff>